<commit_message>
Updated slides and code
</commit_message>
<xml_diff>
--- a/slides/10_logistic_regression_confusion_matrix.pptx
+++ b/slides/10_logistic_regression_confusion_matrix.pptx
@@ -15154,7 +15154,7 @@
           <a:graphicData uri="http://schemas.openxmlformats.org/presentationml/2006/ole">
             <mc:AlternateContent xmlns:mc="http://schemas.openxmlformats.org/markup-compatibility/2006">
               <mc:Choice xmlns:v="urn:schemas-microsoft-com:vml" Requires="v">
-                <p:oleObj spid="_x0000_s4190" name="Equation" r:id="rId3" imgW="825480" imgH="393480" progId="Equation.3">
+                <p:oleObj spid="_x0000_s4198" name="Equation" r:id="rId3" imgW="825480" imgH="393480" progId="Equation.3">
                   <p:embed/>
                 </p:oleObj>
               </mc:Choice>
@@ -15243,7 +15243,7 @@
           <a:graphicData uri="http://schemas.openxmlformats.org/presentationml/2006/ole">
             <mc:AlternateContent xmlns:mc="http://schemas.openxmlformats.org/markup-compatibility/2006">
               <mc:Choice xmlns:v="urn:schemas-microsoft-com:vml" Requires="v">
-                <p:oleObj spid="_x0000_s4191" name="Equation" r:id="rId5" imgW="152400" imgH="139700" progId="Equation.3">
+                <p:oleObj spid="_x0000_s4199" name="Equation" r:id="rId5" imgW="152400" imgH="139700" progId="Equation.3">
                   <p:embed/>
                 </p:oleObj>
               </mc:Choice>
@@ -15326,7 +15326,7 @@
           <a:graphicData uri="http://schemas.openxmlformats.org/presentationml/2006/ole">
             <mc:AlternateContent xmlns:mc="http://schemas.openxmlformats.org/markup-compatibility/2006">
               <mc:Choice xmlns:v="urn:schemas-microsoft-com:vml" Requires="v">
-                <p:oleObj spid="_x0000_s4192" name="Equation" r:id="rId7" imgW="330200" imgH="165100" progId="Equation.3">
+                <p:oleObj spid="_x0000_s4200" name="Equation" r:id="rId7" imgW="330200" imgH="165100" progId="Equation.3">
                   <p:embed/>
                 </p:oleObj>
               </mc:Choice>
@@ -15409,7 +15409,7 @@
           <a:graphicData uri="http://schemas.openxmlformats.org/presentationml/2006/ole">
             <mc:AlternateContent xmlns:mc="http://schemas.openxmlformats.org/markup-compatibility/2006">
               <mc:Choice xmlns:v="urn:schemas-microsoft-com:vml" Requires="v">
-                <p:oleObj spid="_x0000_s4193" name="Equation" r:id="rId9" imgW="1447800" imgH="431800" progId="Equation.3">
+                <p:oleObj spid="_x0000_s4201" name="Equation" r:id="rId9" imgW="1447800" imgH="431800" progId="Equation.3">
                   <p:embed/>
                 </p:oleObj>
               </mc:Choice>
@@ -19295,7 +19295,7 @@
           <a:graphicData uri="http://schemas.openxmlformats.org/presentationml/2006/ole">
             <mc:AlternateContent xmlns:mc="http://schemas.openxmlformats.org/markup-compatibility/2006">
               <mc:Choice xmlns:v="urn:schemas-microsoft-com:vml" Requires="v">
-                <p:oleObj spid="_x0000_s2076" name="Equation" r:id="rId3" imgW="2387600" imgH="215900" progId="Equation.3">
+                <p:oleObj spid="_x0000_s2078" name="Equation" r:id="rId3" imgW="2387600" imgH="215900" progId="Equation.3">
                   <p:embed/>
                 </p:oleObj>
               </mc:Choice>
@@ -19717,7 +19717,7 @@
           <a:graphicData uri="http://schemas.openxmlformats.org/presentationml/2006/ole">
             <mc:AlternateContent xmlns:mc="http://schemas.openxmlformats.org/markup-compatibility/2006">
               <mc:Choice xmlns:v="urn:schemas-microsoft-com:vml" Requires="v">
-                <p:oleObj spid="_x0000_s1090" name="Equation" r:id="rId3" imgW="1155700" imgH="431800" progId="Equation.3">
+                <p:oleObj spid="_x0000_s1094" name="Equation" r:id="rId3" imgW="1155700" imgH="431800" progId="Equation.3">
                   <p:embed/>
                 </p:oleObj>
               </mc:Choice>
@@ -19806,7 +19806,7 @@
           <a:graphicData uri="http://schemas.openxmlformats.org/presentationml/2006/ole">
             <mc:AlternateContent xmlns:mc="http://schemas.openxmlformats.org/markup-compatibility/2006">
               <mc:Choice xmlns:v="urn:schemas-microsoft-com:vml" Requires="v">
-                <p:oleObj spid="_x0000_s1091" name="Equation" r:id="rId5" imgW="812800" imgH="203200" progId="Equation.3">
+                <p:oleObj spid="_x0000_s1095" name="Equation" r:id="rId5" imgW="812800" imgH="203200" progId="Equation.3">
                   <p:embed/>
                 </p:oleObj>
               </mc:Choice>
@@ -20248,7 +20248,7 @@
           <a:graphicData uri="http://schemas.openxmlformats.org/presentationml/2006/ole">
             <mc:AlternateContent xmlns:mc="http://schemas.openxmlformats.org/markup-compatibility/2006">
               <mc:Choice xmlns:v="urn:schemas-microsoft-com:vml" Requires="v">
-                <p:oleObj spid="_x0000_s3100" name="Equation" r:id="rId3" imgW="2260600" imgH="508000" progId="Equation.3">
+                <p:oleObj spid="_x0000_s3102" name="Equation" r:id="rId3" imgW="2260600" imgH="508000" progId="Equation.3">
                   <p:embed/>
                 </p:oleObj>
               </mc:Choice>
@@ -21437,16 +21437,34 @@
               <a:t>0.16288268.  This means for every cheeseburger I eat, I increase the odds of having an unhealthy heart by </a:t>
             </a:r>
             <a:r>
-              <a:rPr lang="en-US" sz="3200" smtClean="0">
+              <a:rPr lang="en-US" sz="3200" dirty="0" err="1" smtClean="0">
                 <a:latin typeface="PFDinTextCompPro-Bold"/>
               </a:rPr>
-              <a:t>exp(</a:t>
+              <a:t>exp</a:t>
             </a:r>
             <a:r>
               <a:rPr lang="en-US" sz="3200" dirty="0" smtClean="0">
                 <a:latin typeface="PFDinTextCompPro-Bold"/>
               </a:rPr>
-              <a:t>0.16288268) = 1.18.</a:t>
+              <a:t>(0.16288268) = 1.18.</a:t>
+            </a:r>
+          </a:p>
+          <a:p>
+            <a:pPr algn="l">
+              <a:buFont typeface="Arial"/>
+              <a:buChar char="•"/>
+            </a:pPr>
+            <a:r>
+              <a:rPr lang="en-US" sz="3200" dirty="0" smtClean="0">
+                <a:latin typeface="PFDinTextCompPro-Bold"/>
+              </a:rPr>
+              <a:t>You could also interpret thi</a:t>
+            </a:r>
+            <a:r>
+              <a:rPr lang="en-US" sz="3200" dirty="0" smtClean="0">
+                <a:latin typeface="PFDinTextCompPro-Bold"/>
+              </a:rPr>
+              <a:t>s as increase the odds by 18%.</a:t>
             </a:r>
             <a:endParaRPr lang="en-US" sz="3200" dirty="0" smtClean="0">
               <a:latin typeface="PFDinTextCompPro-Bold"/>
@@ -21611,6 +21629,55 @@
                                           <p:spTgt spid="6">
                                             <p:txEl>
                                               <p:pRg st="2" end="2"/>
+                                            </p:txEl>
+                                          </p:spTgt>
+                                        </p:tgtEl>
+                                        <p:attrNameLst>
+                                          <p:attrName>style.visibility</p:attrName>
+                                        </p:attrNameLst>
+                                      </p:cBhvr>
+                                      <p:to>
+                                        <p:strVal val="visible"/>
+                                      </p:to>
+                                    </p:set>
+                                  </p:childTnLst>
+                                </p:cTn>
+                              </p:par>
+                            </p:childTnLst>
+                          </p:cTn>
+                        </p:par>
+                      </p:childTnLst>
+                    </p:cTn>
+                  </p:par>
+                  <p:par>
+                    <p:cTn id="15" fill="hold">
+                      <p:stCondLst>
+                        <p:cond delay="indefinite"/>
+                      </p:stCondLst>
+                      <p:childTnLst>
+                        <p:par>
+                          <p:cTn id="16" fill="hold">
+                            <p:stCondLst>
+                              <p:cond delay="0"/>
+                            </p:stCondLst>
+                            <p:childTnLst>
+                              <p:par>
+                                <p:cTn id="17" presetID="1" presetClass="entr" presetSubtype="0" fill="hold" nodeType="clickEffect">
+                                  <p:stCondLst>
+                                    <p:cond delay="0"/>
+                                  </p:stCondLst>
+                                  <p:childTnLst>
+                                    <p:set>
+                                      <p:cBhvr>
+                                        <p:cTn id="18" dur="1" fill="hold">
+                                          <p:stCondLst>
+                                            <p:cond delay="0"/>
+                                          </p:stCondLst>
+                                        </p:cTn>
+                                        <p:tgtEl>
+                                          <p:spTgt spid="6">
+                                            <p:txEl>
+                                              <p:pRg st="3" end="3"/>
                                             </p:txEl>
                                           </p:spTgt>
                                         </p:tgtEl>

</xml_diff>

<commit_message>
Updated class 10 material
</commit_message>
<xml_diff>
--- a/slides/10_logistic_regression_confusion_matrix.pptx
+++ b/slides/10_logistic_regression_confusion_matrix.pptx
@@ -259,7 +259,7 @@
           <a:p>
             <a:fld id="{DB92F479-4B50-F243-9713-1B12EC2B4BDB}" type="datetimeFigureOut">
               <a:rPr lang="en-US" smtClean="0"/>
-              <a:t>4/19/15</a:t>
+              <a:t>4/20/15</a:t>
             </a:fld>
             <a:endParaRPr lang="en-US"/>
           </a:p>
@@ -15124,7 +15124,25 @@
               <a:rPr lang="en-US" sz="3200" dirty="0" smtClean="0">
                 <a:latin typeface="+mj-lt"/>
               </a:rPr>
-              <a:t>The log odds are the natural logs of the odds.</a:t>
+              <a:t>The log odds are the </a:t>
+            </a:r>
+            <a:r>
+              <a:rPr lang="en-US" sz="3200" smtClean="0">
+                <a:latin typeface="+mj-lt"/>
+              </a:rPr>
+              <a:t>natural </a:t>
+            </a:r>
+            <a:r>
+              <a:rPr lang="en-US" sz="3200" smtClean="0">
+                <a:latin typeface="+mj-lt"/>
+              </a:rPr>
+              <a:t>log </a:t>
+            </a:r>
+            <a:r>
+              <a:rPr lang="en-US" sz="3200" dirty="0" smtClean="0">
+                <a:latin typeface="+mj-lt"/>
+              </a:rPr>
+              <a:t>of the odds.</a:t>
             </a:r>
             <a:endParaRPr sz="3200" dirty="0">
               <a:latin typeface="+mj-lt"/>
@@ -15154,7 +15172,7 @@
           <a:graphicData uri="http://schemas.openxmlformats.org/presentationml/2006/ole">
             <mc:AlternateContent xmlns:mc="http://schemas.openxmlformats.org/markup-compatibility/2006">
               <mc:Choice xmlns:v="urn:schemas-microsoft-com:vml" Requires="v">
-                <p:oleObj spid="_x0000_s4206" name="Equation" r:id="rId3" imgW="825480" imgH="393480" progId="Equation.3">
+                <p:oleObj spid="_x0000_s4211" name="Equation" r:id="rId3" imgW="825480" imgH="393480" progId="Equation.3">
                   <p:embed/>
                 </p:oleObj>
               </mc:Choice>
@@ -15243,7 +15261,7 @@
           <a:graphicData uri="http://schemas.openxmlformats.org/presentationml/2006/ole">
             <mc:AlternateContent xmlns:mc="http://schemas.openxmlformats.org/markup-compatibility/2006">
               <mc:Choice xmlns:v="urn:schemas-microsoft-com:vml" Requires="v">
-                <p:oleObj spid="_x0000_s4207" name="Equation" r:id="rId5" imgW="152400" imgH="139700" progId="Equation.3">
+                <p:oleObj spid="_x0000_s4212" name="Equation" r:id="rId5" imgW="152400" imgH="139700" progId="Equation.3">
                   <p:embed/>
                 </p:oleObj>
               </mc:Choice>
@@ -15326,7 +15344,7 @@
           <a:graphicData uri="http://schemas.openxmlformats.org/presentationml/2006/ole">
             <mc:AlternateContent xmlns:mc="http://schemas.openxmlformats.org/markup-compatibility/2006">
               <mc:Choice xmlns:v="urn:schemas-microsoft-com:vml" Requires="v">
-                <p:oleObj spid="_x0000_s4208" name="Equation" r:id="rId7" imgW="330200" imgH="165100" progId="Equation.3">
+                <p:oleObj spid="_x0000_s4213" name="Equation" r:id="rId7" imgW="330200" imgH="165100" progId="Equation.3">
                   <p:embed/>
                 </p:oleObj>
               </mc:Choice>
@@ -15409,7 +15427,7 @@
           <a:graphicData uri="http://schemas.openxmlformats.org/presentationml/2006/ole">
             <mc:AlternateContent xmlns:mc="http://schemas.openxmlformats.org/markup-compatibility/2006">
               <mc:Choice xmlns:v="urn:schemas-microsoft-com:vml" Requires="v">
-                <p:oleObj spid="_x0000_s4209" name="Equation" r:id="rId9" imgW="1447800" imgH="431800" progId="Equation.3">
+                <p:oleObj spid="_x0000_s4214" name="Equation" r:id="rId9" imgW="1447800" imgH="431800" progId="Equation.3">
                   <p:embed/>
                 </p:oleObj>
               </mc:Choice>
@@ -16026,13 +16044,7 @@
               <a:rPr lang="en-US" sz="3200" dirty="0" smtClean="0">
                 <a:latin typeface="+mj-lt"/>
               </a:rPr>
-              <a:t>Take three </a:t>
-            </a:r>
-            <a:r>
-              <a:rPr lang="en-US" sz="3200" dirty="0" smtClean="0">
-                <a:latin typeface="+mj-lt"/>
-              </a:rPr>
-              <a:t>minutes to confirm that you get the numbers below for odds and log odds.</a:t>
+              <a:t>Take three minutes to confirm that you get the numbers below for odds and log odds.</a:t>
             </a:r>
             <a:endParaRPr sz="3200" dirty="0">
               <a:latin typeface="+mj-lt"/>
@@ -19295,7 +19307,7 @@
           <a:graphicData uri="http://schemas.openxmlformats.org/presentationml/2006/ole">
             <mc:AlternateContent xmlns:mc="http://schemas.openxmlformats.org/markup-compatibility/2006">
               <mc:Choice xmlns:v="urn:schemas-microsoft-com:vml" Requires="v">
-                <p:oleObj spid="_x0000_s2080" name="Equation" r:id="rId3" imgW="2387600" imgH="215900" progId="Equation.3">
+                <p:oleObj spid="_x0000_s2082" name="Equation" r:id="rId3" imgW="2387600" imgH="215900" progId="Equation.3">
                   <p:embed/>
                 </p:oleObj>
               </mc:Choice>
@@ -19717,7 +19729,7 @@
           <a:graphicData uri="http://schemas.openxmlformats.org/presentationml/2006/ole">
             <mc:AlternateContent xmlns:mc="http://schemas.openxmlformats.org/markup-compatibility/2006">
               <mc:Choice xmlns:v="urn:schemas-microsoft-com:vml" Requires="v">
-                <p:oleObj spid="_x0000_s1098" name="Equation" r:id="rId3" imgW="1155700" imgH="431800" progId="Equation.3">
+                <p:oleObj spid="_x0000_s1101" name="Equation" r:id="rId3" imgW="1155700" imgH="431800" progId="Equation.3">
                   <p:embed/>
                 </p:oleObj>
               </mc:Choice>
@@ -19806,7 +19818,7 @@
           <a:graphicData uri="http://schemas.openxmlformats.org/presentationml/2006/ole">
             <mc:AlternateContent xmlns:mc="http://schemas.openxmlformats.org/markup-compatibility/2006">
               <mc:Choice xmlns:v="urn:schemas-microsoft-com:vml" Requires="v">
-                <p:oleObj spid="_x0000_s1099" name="Equation" r:id="rId5" imgW="812800" imgH="203200" progId="Equation.3">
+                <p:oleObj spid="_x0000_s1102" name="Equation" r:id="rId5" imgW="812800" imgH="203200" progId="Equation.3">
                   <p:embed/>
                 </p:oleObj>
               </mc:Choice>
@@ -20248,7 +20260,7 @@
           <a:graphicData uri="http://schemas.openxmlformats.org/presentationml/2006/ole">
             <mc:AlternateContent xmlns:mc="http://schemas.openxmlformats.org/markup-compatibility/2006">
               <mc:Choice xmlns:v="urn:schemas-microsoft-com:vml" Requires="v">
-                <p:oleObj spid="_x0000_s3104" name="Equation" r:id="rId3" imgW="2260600" imgH="508000" progId="Equation.3">
+                <p:oleObj spid="_x0000_s3106" name="Equation" r:id="rId3" imgW="2260600" imgH="508000" progId="Equation.3">
                   <p:embed/>
                 </p:oleObj>
               </mc:Choice>
@@ -21006,17 +21018,8 @@
               <a:rPr lang="en-US" sz="3200" dirty="0" smtClean="0">
                 <a:latin typeface="PFDinTextCompPro-Bold"/>
               </a:rPr>
-              <a:t>Now that we have an equation, </a:t>
-            </a:r>
-            <a:r>
-              <a:rPr lang="en-US" sz="3200" dirty="0" smtClean="0">
-                <a:latin typeface="PFDinTextCompPro-Bold"/>
-              </a:rPr>
-              <a:t>what do the coefficients mean?</a:t>
-            </a:r>
-            <a:endParaRPr lang="en-US" sz="3200" dirty="0" smtClean="0">
-              <a:latin typeface="PFDinTextCompPro-Bold"/>
-            </a:endParaRPr>
+              <a:t>Now that we have an equation, what do the coefficients mean?</a:t>
+            </a:r>
           </a:p>
           <a:p>
             <a:pPr algn="l">
@@ -21029,9 +21032,6 @@
               </a:rPr>
               <a:t>For every unit increase in X, there is a β increase in the log odds of class membership and vice versa.</a:t>
             </a:r>
-            <a:endParaRPr lang="en-US" sz="3200" dirty="0" smtClean="0">
-              <a:latin typeface="PFDinTextCompPro-Bold"/>
-            </a:endParaRPr>
           </a:p>
           <a:p>
             <a:pPr algn="l">
@@ -21128,9 +21128,6 @@
               </a:rPr>
               <a:t>to the previous odds.</a:t>
             </a:r>
-            <a:endParaRPr lang="en-US" sz="3200" dirty="0" smtClean="0">
-              <a:latin typeface="PFDinTextCompPro-Bold"/>
-            </a:endParaRPr>
           </a:p>
         </p:txBody>
       </p:sp>
@@ -21495,19 +21492,7 @@
               <a:rPr lang="en-US" sz="3200" dirty="0" smtClean="0">
                 <a:latin typeface="PFDinTextCompPro-Bold"/>
               </a:rPr>
-              <a:t>Let’s say I am trying to predict whether your heart is </a:t>
-            </a:r>
-            <a:r>
-              <a:rPr lang="en-US" sz="3200" dirty="0" smtClean="0">
-                <a:latin typeface="PFDinTextCompPro-Bold"/>
-              </a:rPr>
-              <a:t>un</a:t>
-            </a:r>
-            <a:r>
-              <a:rPr lang="en-US" sz="3200" dirty="0" smtClean="0">
-                <a:latin typeface="PFDinTextCompPro-Bold"/>
-              </a:rPr>
-              <a:t>healthy or not, yes or no.</a:t>
+              <a:t>Let’s say I am trying to predict whether your heart is unhealthy or not, yes or no.</a:t>
             </a:r>
           </a:p>
           <a:p>
@@ -21567,17 +21552,8 @@
               <a:rPr lang="en-US" sz="3200" dirty="0" smtClean="0">
                 <a:latin typeface="PFDinTextCompPro-Bold"/>
               </a:rPr>
-              <a:t>You could also interpret thi</a:t>
-            </a:r>
-            <a:r>
-              <a:rPr lang="en-US" sz="3200" dirty="0" smtClean="0">
-                <a:latin typeface="PFDinTextCompPro-Bold"/>
-              </a:rPr>
-              <a:t>s as increase the odds by 18%.</a:t>
-            </a:r>
-            <a:endParaRPr lang="en-US" sz="3200" dirty="0" smtClean="0">
-              <a:latin typeface="PFDinTextCompPro-Bold"/>
-            </a:endParaRPr>
+              <a:t>You could also interpret this as increase the odds by 18%.</a:t>
+            </a:r>
           </a:p>
         </p:txBody>
       </p:sp>

</xml_diff>